<commit_message>
revised README file and PPT file
</commit_message>
<xml_diff>
--- a/project_1/Project 1 Presentation.pptx
+++ b/project_1/Project 1 Presentation.pptx
@@ -287,7 +287,7 @@
           <a:p>
             <a:fld id="{4EC743F4-8769-40B4-85DF-6CB8DE9F66AA}" type="datetimeFigureOut">
               <a:rPr lang="en-US" smtClean="0"/>
-              <a:t>9/1/2021</a:t>
+              <a:t>9/2/2021</a:t>
             </a:fld>
             <a:endParaRPr lang="en-US"/>
           </a:p>
@@ -830,7 +830,7 @@
           <a:p>
             <a:fld id="{4EC743F4-8769-40B4-85DF-6CB8DE9F66AA}" type="datetimeFigureOut">
               <a:rPr lang="en-US" smtClean="0"/>
-              <a:t>9/1/2021</a:t>
+              <a:t>9/2/2021</a:t>
             </a:fld>
             <a:endParaRPr lang="en-US"/>
           </a:p>
@@ -1038,7 +1038,7 @@
           <a:p>
             <a:fld id="{4EC743F4-8769-40B4-85DF-6CB8DE9F66AA}" type="datetimeFigureOut">
               <a:rPr lang="en-US" smtClean="0"/>
-              <a:t>9/1/2021</a:t>
+              <a:t>9/2/2021</a:t>
             </a:fld>
             <a:endParaRPr lang="en-US"/>
           </a:p>
@@ -1237,7 +1237,7 @@
           <a:p>
             <a:fld id="{4EC743F4-8769-40B4-85DF-6CB8DE9F66AA}" type="datetimeFigureOut">
               <a:rPr lang="en-US" smtClean="0"/>
-              <a:t>9/1/2021</a:t>
+              <a:t>9/2/2021</a:t>
             </a:fld>
             <a:endParaRPr lang="en-US"/>
           </a:p>
@@ -1520,7 +1520,7 @@
           <a:p>
             <a:fld id="{4EC743F4-8769-40B4-85DF-6CB8DE9F66AA}" type="datetimeFigureOut">
               <a:rPr lang="en-US" smtClean="0"/>
-              <a:t>9/1/2021</a:t>
+              <a:t>9/2/2021</a:t>
             </a:fld>
             <a:endParaRPr lang="en-US" dirty="0"/>
           </a:p>
@@ -2471,7 +2471,7 @@
           <a:p>
             <a:fld id="{4EC743F4-8769-40B4-85DF-6CB8DE9F66AA}" type="datetimeFigureOut">
               <a:rPr lang="en-US" smtClean="0"/>
-              <a:t>9/1/2021</a:t>
+              <a:t>9/2/2021</a:t>
             </a:fld>
             <a:endParaRPr lang="en-US"/>
           </a:p>
@@ -2890,7 +2890,7 @@
           <a:p>
             <a:fld id="{4EC743F4-8769-40B4-85DF-6CB8DE9F66AA}" type="datetimeFigureOut">
               <a:rPr lang="en-US" smtClean="0"/>
-              <a:t>9/1/2021</a:t>
+              <a:t>9/2/2021</a:t>
             </a:fld>
             <a:endParaRPr lang="en-US"/>
           </a:p>
@@ -3031,7 +3031,7 @@
           <a:p>
             <a:fld id="{4EC743F4-8769-40B4-85DF-6CB8DE9F66AA}" type="datetimeFigureOut">
               <a:rPr lang="en-US" smtClean="0"/>
-              <a:t>9/1/2021</a:t>
+              <a:t>9/2/2021</a:t>
             </a:fld>
             <a:endParaRPr lang="en-US"/>
           </a:p>
@@ -3144,7 +3144,7 @@
           <a:p>
             <a:fld id="{4EC743F4-8769-40B4-85DF-6CB8DE9F66AA}" type="datetimeFigureOut">
               <a:rPr lang="en-US" smtClean="0"/>
-              <a:t>9/1/2021</a:t>
+              <a:t>9/2/2021</a:t>
             </a:fld>
             <a:endParaRPr lang="en-US"/>
           </a:p>
@@ -3461,7 +3461,7 @@
           <a:p>
             <a:fld id="{4EC743F4-8769-40B4-85DF-6CB8DE9F66AA}" type="datetimeFigureOut">
               <a:rPr lang="en-US" smtClean="0"/>
-              <a:t>9/1/2021</a:t>
+              <a:t>9/2/2021</a:t>
             </a:fld>
             <a:endParaRPr lang="en-US"/>
           </a:p>
@@ -3806,7 +3806,7 @@
           <a:p>
             <a:fld id="{4EC743F4-8769-40B4-85DF-6CB8DE9F66AA}" type="datetimeFigureOut">
               <a:rPr lang="en-US" smtClean="0"/>
-              <a:t>9/1/2021</a:t>
+              <a:t>9/2/2021</a:t>
             </a:fld>
             <a:endParaRPr lang="en-US"/>
           </a:p>
@@ -4101,7 +4101,7 @@
             <a:fld id="{4EC743F4-8769-40B4-85DF-6CB8DE9F66AA}" type="datetimeFigureOut">
               <a:rPr lang="en-US" smtClean="0"/>
               <a:pPr/>
-              <a:t>9/1/2021</a:t>
+              <a:t>9/2/2021</a:t>
             </a:fld>
             <a:endParaRPr lang="en-US" dirty="0"/>
           </a:p>
@@ -6688,7 +6688,7 @@
         <p:spPr>
           <a:xfrm>
             <a:off x="355571" y="5509626"/>
-            <a:ext cx="11480858" cy="923330"/>
+            <a:ext cx="11480858" cy="1200329"/>
           </a:xfrm>
           <a:prstGeom prst="rect">
             <a:avLst/>
@@ -6717,7 +6717,15 @@
             </a:pPr>
             <a:r>
               <a:rPr lang="en-US" dirty="0"/>
-              <a:t>For West Virginia’s score, the negative change was driven by </a:t>
+              <a:t>For West Virginia’s score, the negative change was equally driven by both </a:t>
+            </a:r>
+            <a:r>
+              <a:rPr lang="en-US" dirty="0" err="1"/>
+              <a:t>both</a:t>
+            </a:r>
+            <a:r>
+              <a:rPr lang="en-US" dirty="0"/>
+              <a:t> the Evidence-Based Reading and Writing Section and Math Section (dropped 42 and 45 points respectively)</a:t>
             </a:r>
           </a:p>
         </p:txBody>
@@ -8327,7 +8335,7 @@
             </a:pPr>
             <a:r>
               <a:rPr lang="en-US" dirty="0"/>
-              <a:t>Our data on SAT scores may not be an accurate measurement of students’ ability in a particular state if participation rates vary widely</a:t>
+              <a:t>Our data on SAT scores may not be an accurate measurement of students’ ability in a particular state if participation rates vary widely across all states</a:t>
             </a:r>
           </a:p>
           <a:p>

</xml_diff>

<commit_message>
changes to PPT, README conclusion and Notebook
</commit_message>
<xml_diff>
--- a/project_1/Project 1 Presentation.pptx
+++ b/project_1/Project 1 Presentation.pptx
@@ -6667,7 +6667,15 @@
           <a:p>
             <a:r>
               <a:rPr lang="en-US" sz="2400" b="1" dirty="0"/>
-              <a:t>Top 5 states for SAT 2018 adjusted well to the new changes of the SAT format introduced in March 2016, but not for the bottom 5 states</a:t>
+              <a:t>Top 5 states for </a:t>
+            </a:r>
+            <a:r>
+              <a:rPr lang="en-US" sz="2400" b="1" u="sng" dirty="0"/>
+              <a:t>SAT</a:t>
+            </a:r>
+            <a:r>
+              <a:rPr lang="en-US" sz="2400" b="1" dirty="0"/>
+              <a:t> 2018 adjusted well to the new changes of the SAT format introduced in March 2016, but not for the bottom 5 states</a:t>
             </a:r>
             <a:endParaRPr lang="en-SG" sz="2400" b="1" dirty="0"/>
           </a:p>
@@ -7372,7 +7380,15 @@
           <a:p>
             <a:r>
               <a:rPr lang="en-US" sz="2400" b="1" dirty="0"/>
-              <a:t>On the other hand, we see minimal changes to the ACT scores for top 5 and bottom performing states</a:t>
+              <a:t>On the other hand, we see minimal changes to the </a:t>
+            </a:r>
+            <a:r>
+              <a:rPr lang="en-US" sz="2400" b="1" u="sng" dirty="0"/>
+              <a:t>ACT</a:t>
+            </a:r>
+            <a:r>
+              <a:rPr lang="en-US" sz="2400" b="1" dirty="0"/>
+              <a:t> scores for top 5 and bottom performing states</a:t>
             </a:r>
             <a:endParaRPr lang="en-SG" sz="2400" b="1" dirty="0"/>
           </a:p>
@@ -7986,13 +8002,7 @@
           <a:p>
             <a:r>
               <a:rPr lang="en-US" sz="2400" b="1" dirty="0"/>
-              <a:t>Participation rates influence SAT average scores of states </a:t>
-            </a:r>
-          </a:p>
-          <a:p>
-            <a:r>
-              <a:rPr lang="en-US" sz="2400" b="1" dirty="0"/>
-              <a:t>for both 2017 and 2018</a:t>
+              <a:t>Interesting Observation: Participation rates influence SAT average scores of states for both 2017 and 2018</a:t>
             </a:r>
             <a:endParaRPr lang="en-SG" sz="2400" b="1" dirty="0"/>
           </a:p>
@@ -8180,7 +8190,7 @@
         </p:spPr>
         <p:txBody>
           <a:bodyPr>
-            <a:normAutofit fontScale="92500" lnSpcReduction="10000"/>
+            <a:normAutofit fontScale="92500" lnSpcReduction="20000"/>
           </a:bodyPr>
           <a:lstStyle/>
           <a:p>
@@ -8335,21 +8345,8 @@
             </a:pPr>
             <a:r>
               <a:rPr lang="en-US" dirty="0"/>
-              <a:t>Our data on SAT scores may not be an accurate measurement of students’ ability in a particular state if participation rates vary widely across all states</a:t>
-            </a:r>
-          </a:p>
-          <a:p>
-            <a:pPr marL="61913" lvl="3">
-              <a:lnSpc>
-                <a:spcPct val="100000"/>
-              </a:lnSpc>
-              <a:spcBef>
-                <a:spcPts val="0"/>
-              </a:spcBef>
-              <a:spcAft>
-                <a:spcPts val="1200"/>
-              </a:spcAft>
-            </a:pPr>
+              <a:t>The low SAT participation rates for top performing states may be influencing their SAT scores, therefore we advise to improve those participation rates for more accurate study of this project</a:t>
+            </a:r>
             <a:endParaRPr lang="en-US" b="1" i="0" dirty="0"/>
           </a:p>
           <a:p>

</xml_diff>

<commit_message>
minor updates to PPT
</commit_message>
<xml_diff>
--- a/project_1/Project 1 Presentation.pptx
+++ b/project_1/Project 1 Presentation.pptx
@@ -287,7 +287,7 @@
           <a:p>
             <a:fld id="{4EC743F4-8769-40B4-85DF-6CB8DE9F66AA}" type="datetimeFigureOut">
               <a:rPr lang="en-US" smtClean="0"/>
-              <a:t>9/2/2021</a:t>
+              <a:t>9/3/2021</a:t>
             </a:fld>
             <a:endParaRPr lang="en-US"/>
           </a:p>
@@ -830,7 +830,7 @@
           <a:p>
             <a:fld id="{4EC743F4-8769-40B4-85DF-6CB8DE9F66AA}" type="datetimeFigureOut">
               <a:rPr lang="en-US" smtClean="0"/>
-              <a:t>9/2/2021</a:t>
+              <a:t>9/3/2021</a:t>
             </a:fld>
             <a:endParaRPr lang="en-US"/>
           </a:p>
@@ -1038,7 +1038,7 @@
           <a:p>
             <a:fld id="{4EC743F4-8769-40B4-85DF-6CB8DE9F66AA}" type="datetimeFigureOut">
               <a:rPr lang="en-US" smtClean="0"/>
-              <a:t>9/2/2021</a:t>
+              <a:t>9/3/2021</a:t>
             </a:fld>
             <a:endParaRPr lang="en-US"/>
           </a:p>
@@ -1237,7 +1237,7 @@
           <a:p>
             <a:fld id="{4EC743F4-8769-40B4-85DF-6CB8DE9F66AA}" type="datetimeFigureOut">
               <a:rPr lang="en-US" smtClean="0"/>
-              <a:t>9/2/2021</a:t>
+              <a:t>9/3/2021</a:t>
             </a:fld>
             <a:endParaRPr lang="en-US"/>
           </a:p>
@@ -1520,7 +1520,7 @@
           <a:p>
             <a:fld id="{4EC743F4-8769-40B4-85DF-6CB8DE9F66AA}" type="datetimeFigureOut">
               <a:rPr lang="en-US" smtClean="0"/>
-              <a:t>9/2/2021</a:t>
+              <a:t>9/3/2021</a:t>
             </a:fld>
             <a:endParaRPr lang="en-US" dirty="0"/>
           </a:p>
@@ -2471,7 +2471,7 @@
           <a:p>
             <a:fld id="{4EC743F4-8769-40B4-85DF-6CB8DE9F66AA}" type="datetimeFigureOut">
               <a:rPr lang="en-US" smtClean="0"/>
-              <a:t>9/2/2021</a:t>
+              <a:t>9/3/2021</a:t>
             </a:fld>
             <a:endParaRPr lang="en-US"/>
           </a:p>
@@ -2890,7 +2890,7 @@
           <a:p>
             <a:fld id="{4EC743F4-8769-40B4-85DF-6CB8DE9F66AA}" type="datetimeFigureOut">
               <a:rPr lang="en-US" smtClean="0"/>
-              <a:t>9/2/2021</a:t>
+              <a:t>9/3/2021</a:t>
             </a:fld>
             <a:endParaRPr lang="en-US"/>
           </a:p>
@@ -3031,7 +3031,7 @@
           <a:p>
             <a:fld id="{4EC743F4-8769-40B4-85DF-6CB8DE9F66AA}" type="datetimeFigureOut">
               <a:rPr lang="en-US" smtClean="0"/>
-              <a:t>9/2/2021</a:t>
+              <a:t>9/3/2021</a:t>
             </a:fld>
             <a:endParaRPr lang="en-US"/>
           </a:p>
@@ -3144,7 +3144,7 @@
           <a:p>
             <a:fld id="{4EC743F4-8769-40B4-85DF-6CB8DE9F66AA}" type="datetimeFigureOut">
               <a:rPr lang="en-US" smtClean="0"/>
-              <a:t>9/2/2021</a:t>
+              <a:t>9/3/2021</a:t>
             </a:fld>
             <a:endParaRPr lang="en-US"/>
           </a:p>
@@ -3461,7 +3461,7 @@
           <a:p>
             <a:fld id="{4EC743F4-8769-40B4-85DF-6CB8DE9F66AA}" type="datetimeFigureOut">
               <a:rPr lang="en-US" smtClean="0"/>
-              <a:t>9/2/2021</a:t>
+              <a:t>9/3/2021</a:t>
             </a:fld>
             <a:endParaRPr lang="en-US"/>
           </a:p>
@@ -3806,7 +3806,7 @@
           <a:p>
             <a:fld id="{4EC743F4-8769-40B4-85DF-6CB8DE9F66AA}" type="datetimeFigureOut">
               <a:rPr lang="en-US" smtClean="0"/>
-              <a:t>9/2/2021</a:t>
+              <a:t>9/3/2021</a:t>
             </a:fld>
             <a:endParaRPr lang="en-US"/>
           </a:p>
@@ -4101,7 +4101,7 @@
             <a:fld id="{4EC743F4-8769-40B4-85DF-6CB8DE9F66AA}" type="datetimeFigureOut">
               <a:rPr lang="en-US" smtClean="0"/>
               <a:pPr/>
-              <a:t>9/2/2021</a:t>
+              <a:t>9/3/2021</a:t>
             </a:fld>
             <a:endParaRPr lang="en-US" dirty="0"/>
           </a:p>
@@ -4782,8 +4782,8 @@
         </p:nvSpPr>
         <p:spPr>
           <a:xfrm>
-            <a:off x="2107200" y="2419746"/>
-            <a:ext cx="7977600" cy="1009249"/>
+            <a:off x="1016000" y="2419746"/>
+            <a:ext cx="10078720" cy="1009249"/>
           </a:xfrm>
           <a:solidFill>
             <a:schemeClr val="bg1">
@@ -4799,7 +4799,7 @@
           <a:p>
             <a:r>
               <a:rPr lang="en-US" dirty="0"/>
-              <a:t>Working on the SAT Format </a:t>
+              <a:t>Evaluating on the new SAT Format 2016 </a:t>
             </a:r>
             <a:endParaRPr lang="en-SG" dirty="0"/>
           </a:p>
@@ -4887,7 +4887,7 @@
         </p:spPr>
         <p:txBody>
           <a:bodyPr vert="horz" lIns="91440" tIns="45720" rIns="91440" bIns="45720" rtlCol="0" anchor="b" anchorCtr="0">
-            <a:normAutofit fontScale="77500" lnSpcReduction="20000"/>
+            <a:normAutofit fontScale="70000" lnSpcReduction="20000"/>
           </a:bodyPr>
           <a:lstStyle>
             <a:lvl1pPr algn="ctr" defTabSz="914400" rtl="0" eaLnBrk="1" latinLnBrk="0" hangingPunct="1">
@@ -4911,7 +4911,7 @@
           <a:p>
             <a:r>
               <a:rPr lang="en-US" dirty="0"/>
-              <a:t>An analysis to understand the averages of the SAT Scores across all states for 2017 and 2018</a:t>
+              <a:t>An analysis to understand the impact of the new format on the averages of the SAT Scores across all states for 2017 and 2018</a:t>
             </a:r>
             <a:endParaRPr lang="en-SG" dirty="0"/>
           </a:p>

</xml_diff>